<commit_message>
edited typo on slide 3
</commit_message>
<xml_diff>
--- a/cs1675_rec4_sept21.pptx
+++ b/cs1675_rec4_sept21.pptx
@@ -3977,7 +3977,7 @@
                   <a:srgbClr val="0070C0"/>
                 </a:solidFill>
               </a:rPr>
-              <a:t>concatenation, matrix multiplication, concatenation, transpose and inv </a:t>
+              <a:t>concatenation, matrix multiplication, transpose and inv </a:t>
             </a:r>
             <a:r>
               <a:rPr lang="en-US" sz="2200" dirty="0"/>
@@ -4257,8 +4257,8 @@
           </a:p>
         </p:txBody>
       </p:sp>
-      <mc:AlternateContent xmlns:mc="http://schemas.openxmlformats.org/markup-compatibility/2006">
-        <mc:Choice xmlns:a14="http://schemas.microsoft.com/office/drawing/2010/main" Requires="a14">
+      <mc:AlternateContent xmlns:mc="http://schemas.openxmlformats.org/markup-compatibility/2006" xmlns:a14="http://schemas.microsoft.com/office/drawing/2010/main">
+        <mc:Choice Requires="a14">
           <p:sp>
             <p:nvSpPr>
               <p:cNvPr id="4" name="TextBox 3">
@@ -4658,7 +4658,7 @@
             </p:txBody>
           </p:sp>
         </mc:Choice>
-        <mc:Fallback>
+        <mc:Fallback xmlns="">
           <p:sp>
             <p:nvSpPr>
               <p:cNvPr id="4" name="TextBox 3">

</xml_diff>